<commit_message>
Przywrócenie do życia wykresu Beaty + aktualizacja prezentacji
</commit_message>
<xml_diff>
--- a/DataDraw.pptx
+++ b/DataDraw.pptx
@@ -47087,6 +47087,14 @@
             <a:pPr lvl="1"/>
             <a:r>
               <a:rPr lang="pl-PL" dirty="0" err="1"/>
+              <a:t>Highcharts</a:t>
+            </a:r>
+            <a:endParaRPr lang="pl-PL" dirty="0"/>
+          </a:p>
+          <a:p>
+            <a:pPr lvl="1"/>
+            <a:r>
+              <a:rPr lang="pl-PL" dirty="0" err="1"/>
               <a:t>Plotly</a:t>
             </a:r>
             <a:endParaRPr lang="pl-PL" dirty="0"/>
@@ -47127,8 +47135,8 @@
         </p:blipFill>
         <p:spPr>
           <a:xfrm>
-            <a:off x="395536" y="4941168"/>
-            <a:ext cx="9144000" cy="6104696"/>
+            <a:off x="0" y="1600200"/>
+            <a:ext cx="9144000" cy="6725344"/>
           </a:xfrm>
           <a:prstGeom prst="rect">
             <a:avLst/>
@@ -47183,7 +47191,7 @@
                                     <p:cond delay="0"/>
                                   </p:stCondLst>
                                   <p:childTnLst>
-                                    <p:animMotion origin="layout" path="M 8.33333E-7 7.40741E-7 L 8.33333E-7 0.45023 " pathEditMode="relative" rAng="0" ptsTypes="AA">
+                                    <p:animMotion origin="layout" path="M 0 -1.11111E-6 L 0 0.53241 " pathEditMode="relative" rAng="0" ptsTypes="AA">
                                       <p:cBhvr>
                                         <p:cTn id="6" dur="2000" fill="hold"/>
                                         <p:tgtEl>
@@ -47194,7 +47202,7 @@
                                           <p:attrName>ppt_y</p:attrName>
                                         </p:attrNameLst>
                                       </p:cBhvr>
-                                      <p:rCtr x="0" y="22500"/>
+                                      <p:rCtr x="0" y="26620"/>
                                     </p:animMotion>
                                   </p:childTnLst>
                                 </p:cTn>

</xml_diff>